<commit_message>
Updated Lecture 1 ppt
</commit_message>
<xml_diff>
--- a/Tchekhovskoy_COFI_Lecture_1.pptx
+++ b/Tchekhovskoy_COFI_Lecture_1.pptx
@@ -233,7 +233,7 @@
               <a:rPr lang="en-US" smtClean="0">
                 <a:latin typeface="Helvetica Neue Light" panose="02000403000000020004" pitchFamily="2" charset="0"/>
               </a:rPr>
-              <a:t>12/13/2023</a:t>
+              <a:t>12/14/2023</a:t>
             </a:fld>
             <a:endParaRPr lang="en-US" dirty="0">
               <a:latin typeface="Helvetica Neue Light" panose="02000403000000020004" pitchFamily="2" charset="0"/>
@@ -412,7 +412,7 @@
             <a:fld id="{5AE82BA9-193E-D440-8A2C-9653656F2AE3}" type="datetimeFigureOut">
               <a:rPr lang="en-US" smtClean="0"/>
               <a:pPr/>
-              <a:t>12/13/2023</a:t>
+              <a:t>12/14/2023</a:t>
             </a:fld>
             <a:endParaRPr lang="en-US" dirty="0"/>
           </a:p>
@@ -1728,7 +1728,7 @@
             <a:fld id="{B362BA78-8688-C546-A03A-2A39F84C0B58}" type="datetime1">
               <a:rPr lang="en-US" smtClean="0"/>
               <a:pPr/>
-              <a:t>12/13/2023</a:t>
+              <a:t>12/14/2023</a:t>
             </a:fld>
             <a:endParaRPr lang="en-US" dirty="0"/>
           </a:p>
@@ -1948,7 +1948,7 @@
             <a:fld id="{EF5B9135-15EF-DE46-84CC-16626B0FAF7F}" type="datetime1">
               <a:rPr lang="en-US" smtClean="0"/>
               <a:pPr/>
-              <a:t>12/13/2023</a:t>
+              <a:t>12/14/2023</a:t>
             </a:fld>
             <a:endParaRPr lang="en-US" dirty="0"/>
           </a:p>
@@ -2198,7 +2198,7 @@
           <a:p>
             <a:fld id="{99477ADD-011F-3541-9724-9C7FC92455D5}" type="datetime1">
               <a:rPr lang="en-US" smtClean="0"/>
-              <a:t>12/13/2023</a:t>
+              <a:t>12/14/2023</a:t>
             </a:fld>
             <a:endParaRPr lang="en-US"/>
           </a:p>
@@ -2418,7 +2418,7 @@
           <a:p>
             <a:fld id="{D98C176C-065F-124D-AAA4-94F2B7A2EC7C}" type="datetime1">
               <a:rPr lang="en-US" smtClean="0"/>
-              <a:t>12/13/2023</a:t>
+              <a:t>12/14/2023</a:t>
             </a:fld>
             <a:endParaRPr lang="en-US"/>
           </a:p>
@@ -2537,7 +2537,7 @@
             <a:fld id="{D3421027-4EC0-9C48-8CFB-B8A3104CB056}" type="datetime1">
               <a:rPr lang="en-US" smtClean="0"/>
               <a:pPr/>
-              <a:t>12/13/2023</a:t>
+              <a:t>12/14/2023</a:t>
             </a:fld>
             <a:endParaRPr lang="en-US" dirty="0"/>
           </a:p>
@@ -2804,7 +2804,7 @@
             <a:fld id="{FA5DAB8B-8178-D047-869E-5A62AF236443}" type="datetime1">
               <a:rPr lang="en-US" smtClean="0"/>
               <a:pPr/>
-              <a:t>12/13/2023</a:t>
+              <a:t>12/14/2023</a:t>
             </a:fld>
             <a:endParaRPr lang="en-US" dirty="0"/>
           </a:p>
@@ -3018,7 +3018,7 @@
             <a:fld id="{B9AB8213-A564-3C44-8CA0-968996562138}" type="datetime1">
               <a:rPr lang="en-US" smtClean="0"/>
               <a:pPr/>
-              <a:t>12/13/2023</a:t>
+              <a:t>12/14/2023</a:t>
             </a:fld>
             <a:endParaRPr lang="en-US" dirty="0"/>
           </a:p>
@@ -3293,7 +3293,7 @@
             <a:fld id="{0A83DA12-03A5-114A-ABAE-78CD6BB6AC19}" type="datetime1">
               <a:rPr lang="en-US" smtClean="0"/>
               <a:pPr/>
-              <a:t>12/13/2023</a:t>
+              <a:t>12/14/2023</a:t>
             </a:fld>
             <a:endParaRPr lang="en-US" dirty="0"/>
           </a:p>
@@ -3624,7 +3624,7 @@
             <a:fld id="{1FFF386F-14E4-954A-9EC2-E277FFD66D49}" type="datetime1">
               <a:rPr lang="en-US" smtClean="0"/>
               <a:pPr/>
-              <a:t>12/13/2023</a:t>
+              <a:t>12/14/2023</a:t>
             </a:fld>
             <a:endParaRPr lang="en-US" dirty="0"/>
           </a:p>
@@ -4093,7 +4093,7 @@
             <a:fld id="{D8FFCF06-3344-8345-BEA6-DDAEFCC6ECCE}" type="datetime1">
               <a:rPr lang="en-US" smtClean="0"/>
               <a:pPr/>
-              <a:t>12/13/2023</a:t>
+              <a:t>12/14/2023</a:t>
             </a:fld>
             <a:endParaRPr lang="en-US" dirty="0"/>
           </a:p>
@@ -4236,7 +4236,7 @@
             <a:fld id="{84C6D879-35D4-554E-9D6D-93E8130AA922}" type="datetime1">
               <a:rPr lang="en-US" smtClean="0"/>
               <a:pPr/>
-              <a:t>12/13/2023</a:t>
+              <a:t>12/14/2023</a:t>
             </a:fld>
             <a:endParaRPr lang="en-US" dirty="0"/>
           </a:p>
@@ -4545,7 +4545,7 @@
             <a:fld id="{AB182AE3-760A-8E44-AB65-03A533386DFC}" type="datetime1">
               <a:rPr lang="en-US" smtClean="0"/>
               <a:pPr/>
-              <a:t>12/13/2023</a:t>
+              <a:t>12/14/2023</a:t>
             </a:fld>
             <a:endParaRPr lang="en-US" dirty="0"/>
           </a:p>
@@ -4839,7 +4839,7 @@
             <a:fld id="{D98C176C-065F-124D-AAA4-94F2B7A2EC7C}" type="datetime1">
               <a:rPr lang="en-US" smtClean="0"/>
               <a:pPr/>
-              <a:t>12/13/2023</a:t>
+              <a:t>12/14/2023</a:t>
             </a:fld>
             <a:endParaRPr lang="en-US" dirty="0"/>
           </a:p>
@@ -5466,7 +5466,7 @@
           </a:ln>
           <a:extLst>
             <a:ext uri="{C572A759-6A51-4108-AA02-DFA0A04FC94B}">
-              <ma14:wrappingTextBoxFlag xmlns="" xmlns:m="http://schemas.openxmlformats.org/officeDocument/2006/math" xmlns:a14="http://schemas.microsoft.com/office/drawing/2010/main" xmlns:ma14="http://schemas.microsoft.com/office/mac/drawingml/2011/main" val="1"/>
+              <ma14:wrappingTextBoxFlag xmlns:ma14="http://schemas.microsoft.com/office/mac/drawingml/2011/main" xmlns:a14="http://schemas.microsoft.com/office/drawing/2010/main" xmlns:m="http://schemas.openxmlformats.org/officeDocument/2006/math" xmlns="" val="1"/>
             </a:ext>
           </a:extLst>
         </p:spPr>
@@ -5743,7 +5743,7 @@
           </a:ln>
           <a:extLst>
             <a:ext uri="{C572A759-6A51-4108-AA02-DFA0A04FC94B}">
-              <ma14:wrappingTextBoxFlag xmlns="" xmlns:m="http://schemas.openxmlformats.org/officeDocument/2006/math" xmlns:a14="http://schemas.microsoft.com/office/drawing/2010/main" xmlns:ma14="http://schemas.microsoft.com/office/mac/drawingml/2011/main" val="1"/>
+              <ma14:wrappingTextBoxFlag xmlns:ma14="http://schemas.microsoft.com/office/mac/drawingml/2011/main" xmlns:a14="http://schemas.microsoft.com/office/drawing/2010/main" xmlns:m="http://schemas.openxmlformats.org/officeDocument/2006/math" xmlns="" val="1"/>
             </a:ext>
           </a:extLst>
         </p:spPr>
@@ -5798,7 +5798,7 @@
           </a:ln>
           <a:extLst>
             <a:ext uri="{C572A759-6A51-4108-AA02-DFA0A04FC94B}">
-              <ma14:wrappingTextBoxFlag xmlns="" xmlns:m="http://schemas.openxmlformats.org/officeDocument/2006/math" xmlns:a14="http://schemas.microsoft.com/office/drawing/2010/main" xmlns:ma14="http://schemas.microsoft.com/office/mac/drawingml/2011/main" val="1"/>
+              <ma14:wrappingTextBoxFlag xmlns:ma14="http://schemas.microsoft.com/office/mac/drawingml/2011/main" xmlns:a14="http://schemas.microsoft.com/office/drawing/2010/main" xmlns:m="http://schemas.openxmlformats.org/officeDocument/2006/math" xmlns="" val="1"/>
             </a:ext>
           </a:extLst>
         </p:spPr>
@@ -5984,7 +5984,7 @@
           </a:ln>
           <a:extLst>
             <a:ext uri="{C572A759-6A51-4108-AA02-DFA0A04FC94B}">
-              <ma14:wrappingTextBoxFlag xmlns="" xmlns:m="http://schemas.openxmlformats.org/officeDocument/2006/math" xmlns:a14="http://schemas.microsoft.com/office/drawing/2010/main" xmlns:ma14="http://schemas.microsoft.com/office/mac/drawingml/2011/main" val="1"/>
+              <ma14:wrappingTextBoxFlag xmlns:ma14="http://schemas.microsoft.com/office/mac/drawingml/2011/main" xmlns:a14="http://schemas.microsoft.com/office/drawing/2010/main" xmlns:m="http://schemas.openxmlformats.org/officeDocument/2006/math" xmlns="" val="1"/>
             </a:ext>
           </a:extLst>
         </p:spPr>
@@ -6325,8 +6325,8 @@
           <a:chExt cx="0" cy="0"/>
         </a:xfrm>
       </p:grpSpPr>
-      <mc:AlternateContent xmlns:mc="http://schemas.openxmlformats.org/markup-compatibility/2006">
-        <mc:Choice xmlns:a14="http://schemas.microsoft.com/office/drawing/2010/main" Requires="a14">
+      <mc:AlternateContent xmlns:mc="http://schemas.openxmlformats.org/markup-compatibility/2006" xmlns:a14="http://schemas.microsoft.com/office/drawing/2010/main">
+        <mc:Choice Requires="a14">
           <p:sp>
             <p:nvSpPr>
               <p:cNvPr id="179" name="Numerical Solutions…"/>
@@ -6346,7 +6346,7 @@
               </a:ln>
               <a:extLst>
                 <a:ext uri="{C572A759-6A51-4108-AA02-DFA0A04FC94B}">
-                  <ma14:wrappingTextBoxFlag xmlns="" xmlns:m="http://schemas.openxmlformats.org/officeDocument/2006/math" xmlns:ma14="http://schemas.microsoft.com/office/mac/drawingml/2011/main" val="1"/>
+                  <ma14:wrappingTextBoxFlag xmlns:ma14="http://schemas.microsoft.com/office/mac/drawingml/2011/main" xmlns:m="http://schemas.openxmlformats.org/officeDocument/2006/math" xmlns="" val="1"/>
                 </a:ext>
               </a:extLst>
             </p:spPr>
@@ -7580,7 +7580,7 @@
             </p:txBody>
           </p:sp>
         </mc:Choice>
-        <mc:Fallback>
+        <mc:Fallback xmlns="">
           <p:sp>
             <p:nvSpPr>
               <p:cNvPr id="179" name="Numerical Solutions…"/>
@@ -7650,7 +7650,7 @@
           </a:ln>
           <a:extLst>
             <a:ext uri="{C572A759-6A51-4108-AA02-DFA0A04FC94B}">
-              <ma14:wrappingTextBoxFlag xmlns="" xmlns:m="http://schemas.openxmlformats.org/officeDocument/2006/math" xmlns:a14="http://schemas.microsoft.com/office/drawing/2010/main" xmlns:ma14="http://schemas.microsoft.com/office/mac/drawingml/2011/main" val="1"/>
+              <ma14:wrappingTextBoxFlag xmlns:ma14="http://schemas.microsoft.com/office/mac/drawingml/2011/main" xmlns:a14="http://schemas.microsoft.com/office/drawing/2010/main" xmlns:m="http://schemas.openxmlformats.org/officeDocument/2006/math" xmlns="" val="1"/>
             </a:ext>
           </a:extLst>
         </p:spPr>
@@ -8010,7 +8010,7 @@
           </a:ln>
           <a:extLst>
             <a:ext uri="{C572A759-6A51-4108-AA02-DFA0A04FC94B}">
-              <ma14:wrappingTextBoxFlag xmlns="" xmlns:m="http://schemas.openxmlformats.org/officeDocument/2006/math" xmlns:a14="http://schemas.microsoft.com/office/drawing/2010/main" xmlns:ma14="http://schemas.microsoft.com/office/mac/drawingml/2011/main" val="1"/>
+              <ma14:wrappingTextBoxFlag xmlns:ma14="http://schemas.microsoft.com/office/mac/drawingml/2011/main" xmlns:a14="http://schemas.microsoft.com/office/drawing/2010/main" xmlns:m="http://schemas.openxmlformats.org/officeDocument/2006/math" xmlns="" val="1"/>
             </a:ext>
           </a:extLst>
         </p:spPr>
@@ -8671,7 +8671,7 @@
           </a:ln>
           <a:extLst>
             <a:ext uri="{C572A759-6A51-4108-AA02-DFA0A04FC94B}">
-              <ma14:wrappingTextBoxFlag xmlns="" xmlns:m="http://schemas.openxmlformats.org/officeDocument/2006/math" xmlns:a14="http://schemas.microsoft.com/office/drawing/2010/main" xmlns:ma14="http://schemas.microsoft.com/office/mac/drawingml/2011/main" val="1"/>
+              <ma14:wrappingTextBoxFlag xmlns:ma14="http://schemas.microsoft.com/office/mac/drawingml/2011/main" xmlns:a14="http://schemas.microsoft.com/office/drawing/2010/main" xmlns:m="http://schemas.openxmlformats.org/officeDocument/2006/math" xmlns="" val="1"/>
             </a:ext>
           </a:extLst>
         </p:spPr>
@@ -8720,7 +8720,7 @@
           </a:ln>
           <a:extLst>
             <a:ext uri="{C572A759-6A51-4108-AA02-DFA0A04FC94B}">
-              <ma14:wrappingTextBoxFlag xmlns="" xmlns:m="http://schemas.openxmlformats.org/officeDocument/2006/math" xmlns:a14="http://schemas.microsoft.com/office/drawing/2010/main" xmlns:ma14="http://schemas.microsoft.com/office/mac/drawingml/2011/main" val="1"/>
+              <ma14:wrappingTextBoxFlag xmlns:ma14="http://schemas.microsoft.com/office/mac/drawingml/2011/main" xmlns:a14="http://schemas.microsoft.com/office/drawing/2010/main" xmlns:m="http://schemas.openxmlformats.org/officeDocument/2006/math" xmlns="" val="1"/>
             </a:ext>
           </a:extLst>
         </p:spPr>
@@ -8903,7 +8903,7 @@
           </a:ln>
           <a:extLst>
             <a:ext uri="{C572A759-6A51-4108-AA02-DFA0A04FC94B}">
-              <ma14:wrappingTextBoxFlag xmlns="" xmlns:m="http://schemas.openxmlformats.org/officeDocument/2006/math" xmlns:a14="http://schemas.microsoft.com/office/drawing/2010/main" xmlns:ma14="http://schemas.microsoft.com/office/mac/drawingml/2011/main" val="1"/>
+              <ma14:wrappingTextBoxFlag xmlns:ma14="http://schemas.microsoft.com/office/mac/drawingml/2011/main" xmlns:a14="http://schemas.microsoft.com/office/drawing/2010/main" xmlns:m="http://schemas.openxmlformats.org/officeDocument/2006/math" xmlns="" val="1"/>
             </a:ext>
           </a:extLst>
         </p:spPr>
@@ -9290,7 +9290,7 @@
           </a:ln>
           <a:extLst>
             <a:ext uri="{C572A759-6A51-4108-AA02-DFA0A04FC94B}">
-              <ma14:wrappingTextBoxFlag xmlns="" xmlns:m="http://schemas.openxmlformats.org/officeDocument/2006/math" xmlns:a14="http://schemas.microsoft.com/office/drawing/2010/main" xmlns:ma14="http://schemas.microsoft.com/office/mac/drawingml/2011/main" val="1"/>
+              <ma14:wrappingTextBoxFlag xmlns:ma14="http://schemas.microsoft.com/office/mac/drawingml/2011/main" xmlns:a14="http://schemas.microsoft.com/office/drawing/2010/main" xmlns:m="http://schemas.openxmlformats.org/officeDocument/2006/math" xmlns="" val="1"/>
             </a:ext>
           </a:extLst>
         </p:spPr>
@@ -9423,7 +9423,7 @@
           </a:ln>
           <a:extLst>
             <a:ext uri="{C572A759-6A51-4108-AA02-DFA0A04FC94B}">
-              <ma14:wrappingTextBoxFlag xmlns="" xmlns:m="http://schemas.openxmlformats.org/officeDocument/2006/math" xmlns:a14="http://schemas.microsoft.com/office/drawing/2010/main" xmlns:ma14="http://schemas.microsoft.com/office/mac/drawingml/2011/main" val="1"/>
+              <ma14:wrappingTextBoxFlag xmlns:ma14="http://schemas.microsoft.com/office/mac/drawingml/2011/main" xmlns:a14="http://schemas.microsoft.com/office/drawing/2010/main" xmlns:m="http://schemas.openxmlformats.org/officeDocument/2006/math" xmlns="" val="1"/>
             </a:ext>
           </a:extLst>
         </p:spPr>
@@ -9810,7 +9810,7 @@
           </a:ln>
           <a:extLst>
             <a:ext uri="{C572A759-6A51-4108-AA02-DFA0A04FC94B}">
-              <ma14:wrappingTextBoxFlag xmlns="" xmlns:m="http://schemas.openxmlformats.org/officeDocument/2006/math" xmlns:a14="http://schemas.microsoft.com/office/drawing/2010/main" xmlns:ma14="http://schemas.microsoft.com/office/mac/drawingml/2011/main" val="1"/>
+              <ma14:wrappingTextBoxFlag xmlns:ma14="http://schemas.microsoft.com/office/mac/drawingml/2011/main" xmlns:a14="http://schemas.microsoft.com/office/drawing/2010/main" xmlns:m="http://schemas.openxmlformats.org/officeDocument/2006/math" xmlns="" val="1"/>
             </a:ext>
           </a:extLst>
         </p:spPr>
@@ -10457,7 +10457,7 @@
           </a:ln>
           <a:extLst>
             <a:ext uri="{C572A759-6A51-4108-AA02-DFA0A04FC94B}">
-              <ma14:wrappingTextBoxFlag xmlns="" xmlns:m="http://schemas.openxmlformats.org/officeDocument/2006/math" xmlns:a14="http://schemas.microsoft.com/office/drawing/2010/main" xmlns:ma14="http://schemas.microsoft.com/office/mac/drawingml/2011/main" val="1"/>
+              <ma14:wrappingTextBoxFlag xmlns:ma14="http://schemas.microsoft.com/office/mac/drawingml/2011/main" xmlns:a14="http://schemas.microsoft.com/office/drawing/2010/main" xmlns:m="http://schemas.openxmlformats.org/officeDocument/2006/math" xmlns="" val="1"/>
             </a:ext>
           </a:extLst>
         </p:spPr>
@@ -10817,7 +10817,7 @@
           </a:ln>
           <a:extLst>
             <a:ext uri="{C572A759-6A51-4108-AA02-DFA0A04FC94B}">
-              <ma14:wrappingTextBoxFlag xmlns="" xmlns:m="http://schemas.openxmlformats.org/officeDocument/2006/math" xmlns:a14="http://schemas.microsoft.com/office/drawing/2010/main" xmlns:ma14="http://schemas.microsoft.com/office/mac/drawingml/2011/main" val="1"/>
+              <ma14:wrappingTextBoxFlag xmlns:ma14="http://schemas.microsoft.com/office/mac/drawingml/2011/main" xmlns:a14="http://schemas.microsoft.com/office/drawing/2010/main" xmlns:m="http://schemas.openxmlformats.org/officeDocument/2006/math" xmlns="" val="1"/>
             </a:ext>
           </a:extLst>
         </p:spPr>
@@ -11299,7 +11299,7 @@
           </a:ln>
           <a:extLst>
             <a:ext uri="{C572A759-6A51-4108-AA02-DFA0A04FC94B}">
-              <ma14:wrappingTextBoxFlag xmlns="" xmlns:m="http://schemas.openxmlformats.org/officeDocument/2006/math" xmlns:a14="http://schemas.microsoft.com/office/drawing/2010/main" xmlns:ma14="http://schemas.microsoft.com/office/mac/drawingml/2011/main" val="1"/>
+              <ma14:wrappingTextBoxFlag xmlns:ma14="http://schemas.microsoft.com/office/mac/drawingml/2011/main" xmlns:a14="http://schemas.microsoft.com/office/drawing/2010/main" xmlns:m="http://schemas.openxmlformats.org/officeDocument/2006/math" xmlns="" val="1"/>
             </a:ext>
           </a:extLst>
         </p:spPr>
@@ -11428,7 +11428,7 @@
           </a:ln>
           <a:extLst>
             <a:ext uri="{C572A759-6A51-4108-AA02-DFA0A04FC94B}">
-              <ma14:wrappingTextBoxFlag xmlns="" xmlns:m="http://schemas.openxmlformats.org/officeDocument/2006/math" xmlns:a14="http://schemas.microsoft.com/office/drawing/2010/main" xmlns:ma14="http://schemas.microsoft.com/office/mac/drawingml/2011/main" val="1"/>
+              <ma14:wrappingTextBoxFlag xmlns:ma14="http://schemas.microsoft.com/office/mac/drawingml/2011/main" xmlns:a14="http://schemas.microsoft.com/office/drawing/2010/main" xmlns:m="http://schemas.openxmlformats.org/officeDocument/2006/math" xmlns="" val="1"/>
             </a:ext>
           </a:extLst>
         </p:spPr>
@@ -11819,7 +11819,7 @@
           </a:ln>
           <a:extLst>
             <a:ext uri="{C572A759-6A51-4108-AA02-DFA0A04FC94B}">
-              <ma14:wrappingTextBoxFlag xmlns="" xmlns:m="http://schemas.openxmlformats.org/officeDocument/2006/math" xmlns:a14="http://schemas.microsoft.com/office/drawing/2010/main" xmlns:ma14="http://schemas.microsoft.com/office/mac/drawingml/2011/main" val="1"/>
+              <ma14:wrappingTextBoxFlag xmlns:ma14="http://schemas.microsoft.com/office/mac/drawingml/2011/main" xmlns:a14="http://schemas.microsoft.com/office/drawing/2010/main" xmlns:m="http://schemas.openxmlformats.org/officeDocument/2006/math" xmlns="" val="1"/>
             </a:ext>
           </a:extLst>
         </p:spPr>
@@ -12179,7 +12179,7 @@
           </a:ln>
           <a:extLst>
             <a:ext uri="{C572A759-6A51-4108-AA02-DFA0A04FC94B}">
-              <ma14:wrappingTextBoxFlag xmlns="" xmlns:m="http://schemas.openxmlformats.org/officeDocument/2006/math" xmlns:a14="http://schemas.microsoft.com/office/drawing/2010/main" xmlns:ma14="http://schemas.microsoft.com/office/mac/drawingml/2011/main" val="1"/>
+              <ma14:wrappingTextBoxFlag xmlns:ma14="http://schemas.microsoft.com/office/mac/drawingml/2011/main" xmlns:a14="http://schemas.microsoft.com/office/drawing/2010/main" xmlns:m="http://schemas.openxmlformats.org/officeDocument/2006/math" xmlns="" val="1"/>
             </a:ext>
           </a:extLst>
         </p:spPr>
@@ -12225,7 +12225,7 @@
           </a:ln>
           <a:extLst>
             <a:ext uri="{C572A759-6A51-4108-AA02-DFA0A04FC94B}">
-              <ma14:wrappingTextBoxFlag xmlns="" xmlns:m="http://schemas.openxmlformats.org/officeDocument/2006/math" xmlns:a14="http://schemas.microsoft.com/office/drawing/2010/main" xmlns:ma14="http://schemas.microsoft.com/office/mac/drawingml/2011/main" val="1"/>
+              <ma14:wrappingTextBoxFlag xmlns:ma14="http://schemas.microsoft.com/office/mac/drawingml/2011/main" xmlns:a14="http://schemas.microsoft.com/office/drawing/2010/main" xmlns:m="http://schemas.openxmlformats.org/officeDocument/2006/math" xmlns="" val="1"/>
             </a:ext>
           </a:extLst>
         </p:spPr>
@@ -12321,7 +12321,7 @@
           </a:ln>
           <a:extLst>
             <a:ext uri="{C572A759-6A51-4108-AA02-DFA0A04FC94B}">
-              <ma14:wrappingTextBoxFlag xmlns="" xmlns:m="http://schemas.openxmlformats.org/officeDocument/2006/math" xmlns:a14="http://schemas.microsoft.com/office/drawing/2010/main" xmlns:ma14="http://schemas.microsoft.com/office/mac/drawingml/2011/main" val="1"/>
+              <ma14:wrappingTextBoxFlag xmlns:ma14="http://schemas.microsoft.com/office/mac/drawingml/2011/main" xmlns:a14="http://schemas.microsoft.com/office/drawing/2010/main" xmlns:m="http://schemas.openxmlformats.org/officeDocument/2006/math" xmlns="" val="1"/>
             </a:ext>
           </a:extLst>
         </p:spPr>
@@ -12453,7 +12453,7 @@
           </a:ln>
           <a:extLst>
             <a:ext uri="{C572A759-6A51-4108-AA02-DFA0A04FC94B}">
-              <ma14:wrappingTextBoxFlag xmlns="" xmlns:m="http://schemas.openxmlformats.org/officeDocument/2006/math" xmlns:a14="http://schemas.microsoft.com/office/drawing/2010/main" xmlns:ma14="http://schemas.microsoft.com/office/mac/drawingml/2011/main" val="1"/>
+              <ma14:wrappingTextBoxFlag xmlns:ma14="http://schemas.microsoft.com/office/mac/drawingml/2011/main" xmlns:a14="http://schemas.microsoft.com/office/drawing/2010/main" xmlns:m="http://schemas.openxmlformats.org/officeDocument/2006/math" xmlns="" val="1"/>
             </a:ext>
           </a:extLst>
         </p:spPr>
@@ -12585,7 +12585,7 @@
           </a:ln>
           <a:extLst>
             <a:ext uri="{C572A759-6A51-4108-AA02-DFA0A04FC94B}">
-              <ma14:wrappingTextBoxFlag xmlns="" xmlns:m="http://schemas.openxmlformats.org/officeDocument/2006/math" xmlns:a14="http://schemas.microsoft.com/office/drawing/2010/main" xmlns:ma14="http://schemas.microsoft.com/office/mac/drawingml/2011/main" val="1"/>
+              <ma14:wrappingTextBoxFlag xmlns:ma14="http://schemas.microsoft.com/office/mac/drawingml/2011/main" xmlns:a14="http://schemas.microsoft.com/office/drawing/2010/main" xmlns:m="http://schemas.openxmlformats.org/officeDocument/2006/math" xmlns="" val="1"/>
             </a:ext>
           </a:extLst>
         </p:spPr>
@@ -12717,7 +12717,7 @@
           </a:ln>
           <a:extLst>
             <a:ext uri="{C572A759-6A51-4108-AA02-DFA0A04FC94B}">
-              <ma14:wrappingTextBoxFlag xmlns="" xmlns:m="http://schemas.openxmlformats.org/officeDocument/2006/math" xmlns:a14="http://schemas.microsoft.com/office/drawing/2010/main" xmlns:ma14="http://schemas.microsoft.com/office/mac/drawingml/2011/main" val="1"/>
+              <ma14:wrappingTextBoxFlag xmlns:ma14="http://schemas.microsoft.com/office/mac/drawingml/2011/main" xmlns:a14="http://schemas.microsoft.com/office/drawing/2010/main" xmlns:m="http://schemas.openxmlformats.org/officeDocument/2006/math" xmlns="" val="1"/>
             </a:ext>
           </a:extLst>
         </p:spPr>
@@ -15238,7 +15238,7 @@
           </a:ln>
           <a:extLst>
             <a:ext uri="{C572A759-6A51-4108-AA02-DFA0A04FC94B}">
-              <ma14:wrappingTextBoxFlag xmlns="" xmlns:m="http://schemas.openxmlformats.org/officeDocument/2006/math" xmlns:a14="http://schemas.microsoft.com/office/drawing/2010/main" xmlns:ma14="http://schemas.microsoft.com/office/mac/drawingml/2011/main" val="1"/>
+              <ma14:wrappingTextBoxFlag xmlns:ma14="http://schemas.microsoft.com/office/mac/drawingml/2011/main" xmlns:a14="http://schemas.microsoft.com/office/drawing/2010/main" xmlns:m="http://schemas.openxmlformats.org/officeDocument/2006/math" xmlns="" val="1"/>
             </a:ext>
           </a:extLst>
         </p:spPr>
@@ -15598,7 +15598,7 @@
           </a:ln>
           <a:extLst>
             <a:ext uri="{C572A759-6A51-4108-AA02-DFA0A04FC94B}">
-              <ma14:wrappingTextBoxFlag xmlns="" xmlns:m="http://schemas.openxmlformats.org/officeDocument/2006/math" xmlns:a14="http://schemas.microsoft.com/office/drawing/2010/main" xmlns:ma14="http://schemas.microsoft.com/office/mac/drawingml/2011/main" val="1"/>
+              <ma14:wrappingTextBoxFlag xmlns:ma14="http://schemas.microsoft.com/office/mac/drawingml/2011/main" xmlns:a14="http://schemas.microsoft.com/office/drawing/2010/main" xmlns:m="http://schemas.openxmlformats.org/officeDocument/2006/math" xmlns="" val="1"/>
             </a:ext>
           </a:extLst>
         </p:spPr>
@@ -15775,7 +15775,7 @@
           </a:ln>
           <a:extLst>
             <a:ext uri="{C572A759-6A51-4108-AA02-DFA0A04FC94B}">
-              <ma14:wrappingTextBoxFlag xmlns="" xmlns:m="http://schemas.openxmlformats.org/officeDocument/2006/math" xmlns:a14="http://schemas.microsoft.com/office/drawing/2010/main" xmlns:ma14="http://schemas.microsoft.com/office/mac/drawingml/2011/main" val="1"/>
+              <ma14:wrappingTextBoxFlag xmlns:ma14="http://schemas.microsoft.com/office/mac/drawingml/2011/main" xmlns:a14="http://schemas.microsoft.com/office/drawing/2010/main" xmlns:m="http://schemas.openxmlformats.org/officeDocument/2006/math" xmlns="" val="1"/>
             </a:ext>
           </a:extLst>
         </p:spPr>
@@ -16392,8 +16392,8 @@
           </a:p>
         </p:txBody>
       </p:sp>
-      <mc:AlternateContent xmlns:mc="http://schemas.openxmlformats.org/markup-compatibility/2006">
-        <mc:Choice xmlns:a14="http://schemas.microsoft.com/office/drawing/2010/main" Requires="a14">
+      <mc:AlternateContent xmlns:mc="http://schemas.openxmlformats.org/markup-compatibility/2006" xmlns:a14="http://schemas.microsoft.com/office/drawing/2010/main">
+        <mc:Choice Requires="a14">
           <p:sp>
             <p:nvSpPr>
               <p:cNvPr id="3" name="TextBox 2">
@@ -16436,7 +16436,7 @@
                   <m:oMath xmlns:m="http://schemas.openxmlformats.org/officeDocument/2006/math">
                     <m:r>
                       <a:rPr lang="en-US" b="0" i="1" smtClean="0">
-                        <a:latin typeface="Akkurat Pro Regular"/>
+                        <a:latin typeface="Cambria Math" panose="02040503050406030204" pitchFamily="18" charset="0"/>
                       </a:rPr>
                       <m:t>𝜋</m:t>
                     </m:r>
@@ -16459,7 +16459,7 @@
             </p:txBody>
           </p:sp>
         </mc:Choice>
-        <mc:Fallback>
+        <mc:Fallback xmlns="">
           <p:sp>
             <p:nvSpPr>
               <p:cNvPr id="3" name="TextBox 2">
@@ -16847,8 +16847,8 @@
           </a:p>
         </p:txBody>
       </p:sp>
-      <mc:AlternateContent xmlns:mc="http://schemas.openxmlformats.org/markup-compatibility/2006">
-        <mc:Choice xmlns:a14="http://schemas.microsoft.com/office/drawing/2010/main" Requires="a14">
+      <mc:AlternateContent xmlns:mc="http://schemas.openxmlformats.org/markup-compatibility/2006" xmlns:a14="http://schemas.microsoft.com/office/drawing/2010/main">
+        <mc:Choice Requires="a14">
           <p:sp>
             <p:nvSpPr>
               <p:cNvPr id="15" name="TextBox 14">
@@ -16877,6 +16877,7 @@
               </a:bodyPr>
               <a:lstStyle/>
               <a:p>
+                <a:pPr/>
                 <a14:m>
                   <m:oMathPara xmlns:m="http://schemas.openxmlformats.org/officeDocument/2006/math">
                     <m:oMathParaPr>
@@ -16928,7 +16929,7 @@
             </p:txBody>
           </p:sp>
         </mc:Choice>
-        <mc:Fallback>
+        <mc:Fallback xmlns="">
           <p:sp>
             <p:nvSpPr>
               <p:cNvPr id="15" name="TextBox 14">
@@ -17140,7 +17141,7 @@
           </a:ln>
           <a:extLst>
             <a:ext uri="{C572A759-6A51-4108-AA02-DFA0A04FC94B}">
-              <ma14:wrappingTextBoxFlag xmlns="" xmlns:m="http://schemas.openxmlformats.org/officeDocument/2006/math" xmlns:a14="http://schemas.microsoft.com/office/drawing/2010/main" xmlns:ma14="http://schemas.microsoft.com/office/mac/drawingml/2011/main" val="1"/>
+              <ma14:wrappingTextBoxFlag xmlns:ma14="http://schemas.microsoft.com/office/mac/drawingml/2011/main" xmlns:a14="http://schemas.microsoft.com/office/drawing/2010/main" xmlns:m="http://schemas.openxmlformats.org/officeDocument/2006/math" xmlns="" val="1"/>
             </a:ext>
           </a:extLst>
         </p:spPr>
@@ -17212,7 +17213,7 @@
           </a:ln>
           <a:extLst>
             <a:ext uri="{C572A759-6A51-4108-AA02-DFA0A04FC94B}">
-              <ma14:wrappingTextBoxFlag xmlns="" xmlns:m="http://schemas.openxmlformats.org/officeDocument/2006/math" xmlns:a14="http://schemas.microsoft.com/office/drawing/2010/main" xmlns:ma14="http://schemas.microsoft.com/office/mac/drawingml/2011/main" val="1"/>
+              <ma14:wrappingTextBoxFlag xmlns:ma14="http://schemas.microsoft.com/office/mac/drawingml/2011/main" xmlns:a14="http://schemas.microsoft.com/office/drawing/2010/main" xmlns:m="http://schemas.openxmlformats.org/officeDocument/2006/math" xmlns="" val="1"/>
             </a:ext>
           </a:extLst>
         </p:spPr>
@@ -17299,31 +17300,6 @@
               <a:t>fabs(a - b) &lt; 10*</a:t>
             </a:r>
             <a:r>
-              <a:rPr lang="en-US" sz="2000" dirty="0">
-                <a:latin typeface="Monaco"/>
-                <a:ea typeface="Monaco"/>
-                <a:cs typeface="Monaco"/>
-                <a:sym typeface="Monaco"/>
-              </a:rPr>
-              <a:t>eps</a:t>
-            </a:r>
-            <a:endParaRPr sz="2000" dirty="0">
-              <a:latin typeface="Monaco"/>
-              <a:ea typeface="Monaco"/>
-              <a:cs typeface="Monaco"/>
-              <a:sym typeface="Monaco"/>
-            </a:endParaRPr>
-          </a:p>
-          <a:p>
-            <a:pPr marL="603250" indent="-285750">
-              <a:lnSpc>
-                <a:spcPct val="110000"/>
-              </a:lnSpc>
-              <a:buSzPct val="171000"/>
-              <a:buChar char="•"/>
-              <a:defRPr sz="2100"/>
-            </a:pPr>
-            <a:r>
               <a:rPr lang="en-US" sz="2000" dirty="0" err="1">
                 <a:latin typeface="Monaco"/>
                 <a:ea typeface="Monaco"/>
@@ -17332,6 +17308,31 @@
               </a:rPr>
               <a:t>epsm</a:t>
             </a:r>
+            <a:endParaRPr sz="2000" dirty="0">
+              <a:latin typeface="Monaco"/>
+              <a:ea typeface="Monaco"/>
+              <a:cs typeface="Monaco"/>
+              <a:sym typeface="Monaco"/>
+            </a:endParaRPr>
+          </a:p>
+          <a:p>
+            <a:pPr marL="603250" indent="-285750">
+              <a:lnSpc>
+                <a:spcPct val="110000"/>
+              </a:lnSpc>
+              <a:buSzPct val="171000"/>
+              <a:buChar char="•"/>
+              <a:defRPr sz="2100"/>
+            </a:pPr>
+            <a:r>
+              <a:rPr lang="en-US" sz="2000" dirty="0" err="1">
+                <a:latin typeface="Monaco"/>
+                <a:ea typeface="Monaco"/>
+                <a:cs typeface="Monaco"/>
+                <a:sym typeface="Monaco"/>
+              </a:rPr>
+              <a:t>epsm</a:t>
+            </a:r>
             <a:r>
               <a:rPr lang="en-US" sz="2000" dirty="0">
                 <a:latin typeface="Monaco"/>
@@ -17410,13 +17411,13 @@
               <a:t>(1.0 + </a:t>
             </a:r>
             <a:r>
-              <a:rPr lang="en-US" sz="2000" dirty="0">
+              <a:rPr lang="en-US" sz="2000" dirty="0" err="1">
                 <a:latin typeface="Monaco"/>
                 <a:ea typeface="Monaco"/>
                 <a:cs typeface="Monaco"/>
                 <a:sym typeface="Monaco"/>
               </a:rPr>
-              <a:t>eps</a:t>
+              <a:t>epsm</a:t>
             </a:r>
             <a:r>
               <a:rPr sz="2000" dirty="0">
@@ -17463,13 +17464,13 @@
               <a:t>(1.0 + </a:t>
             </a:r>
             <a:r>
-              <a:rPr lang="en-US" sz="2000" dirty="0">
+              <a:rPr lang="en-US" sz="2000" dirty="0" err="1">
                 <a:latin typeface="Monaco"/>
                 <a:ea typeface="Monaco"/>
                 <a:cs typeface="Monaco"/>
                 <a:sym typeface="Monaco"/>
               </a:rPr>
-              <a:t>eps</a:t>
+              <a:t>epsm</a:t>
             </a:r>
             <a:r>
               <a:rPr sz="2000" dirty="0">
@@ -17569,66 +17570,6 @@
           </a:p>
         </p:txBody>
       </p:sp>
-      <p:pic>
-        <p:nvPicPr>
-          <p:cNvPr id="24" name="Picture 23">
-            <a:extLst>
-              <a:ext uri="{FF2B5EF4-FFF2-40B4-BE49-F238E27FC236}">
-                <a16:creationId xmlns:a16="http://schemas.microsoft.com/office/drawing/2014/main" id="{A875D46F-0CC1-1A13-671E-60231A1CB7B7}"/>
-              </a:ext>
-            </a:extLst>
-          </p:cNvPr>
-          <p:cNvPicPr>
-            <a:picLocks noChangeAspect="1"/>
-          </p:cNvPicPr>
-          <p:nvPr/>
-        </p:nvPicPr>
-        <p:blipFill>
-          <a:blip r:embed="rId3"/>
-          <a:stretch>
-            <a:fillRect/>
-          </a:stretch>
-        </p:blipFill>
-        <p:spPr>
-          <a:xfrm>
-            <a:off x="116115" y="2639005"/>
-            <a:ext cx="3240527" cy="1072198"/>
-          </a:xfrm>
-          <a:prstGeom prst="rect">
-            <a:avLst/>
-          </a:prstGeom>
-        </p:spPr>
-      </p:pic>
-      <p:pic>
-        <p:nvPicPr>
-          <p:cNvPr id="26" name="Picture 25">
-            <a:extLst>
-              <a:ext uri="{FF2B5EF4-FFF2-40B4-BE49-F238E27FC236}">
-                <a16:creationId xmlns:a16="http://schemas.microsoft.com/office/drawing/2014/main" id="{7C0228DE-C58B-E9F2-DD34-6EBB14B1CB19}"/>
-              </a:ext>
-            </a:extLst>
-          </p:cNvPr>
-          <p:cNvPicPr>
-            <a:picLocks noChangeAspect="1"/>
-          </p:cNvPicPr>
-          <p:nvPr/>
-        </p:nvPicPr>
-        <p:blipFill>
-          <a:blip r:embed="rId4"/>
-          <a:stretch>
-            <a:fillRect/>
-          </a:stretch>
-        </p:blipFill>
-        <p:spPr>
-          <a:xfrm>
-            <a:off x="116115" y="690851"/>
-            <a:ext cx="3475736" cy="1539883"/>
-          </a:xfrm>
-          <a:prstGeom prst="rect">
-            <a:avLst/>
-          </a:prstGeom>
-        </p:spPr>
-      </p:pic>
       <p:sp>
         <p:nvSpPr>
           <p:cNvPr id="27" name="Slide Number Placeholder 3">
@@ -17664,6 +17605,36 @@
           </a:p>
         </p:txBody>
       </p:sp>
+      <p:pic>
+        <p:nvPicPr>
+          <p:cNvPr id="3" name="Picture 2">
+            <a:extLst>
+              <a:ext uri="{FF2B5EF4-FFF2-40B4-BE49-F238E27FC236}">
+                <a16:creationId xmlns:a16="http://schemas.microsoft.com/office/drawing/2014/main" id="{D976A082-B51F-881B-5B0B-C2B3DFBE4472}"/>
+              </a:ext>
+            </a:extLst>
+          </p:cNvPr>
+          <p:cNvPicPr>
+            <a:picLocks noChangeAspect="1"/>
+          </p:cNvPicPr>
+          <p:nvPr/>
+        </p:nvPicPr>
+        <p:blipFill>
+          <a:blip r:embed="rId3"/>
+          <a:stretch>
+            <a:fillRect/>
+          </a:stretch>
+        </p:blipFill>
+        <p:spPr>
+          <a:xfrm>
+            <a:off x="251598" y="661897"/>
+            <a:ext cx="3387765" cy="2624695"/>
+          </a:xfrm>
+          <a:prstGeom prst="rect">
+            <a:avLst/>
+          </a:prstGeom>
+        </p:spPr>
+      </p:pic>
     </p:spTree>
     <p:extLst>
       <p:ext uri="{BB962C8B-B14F-4D97-AF65-F5344CB8AC3E}">
@@ -18786,8 +18757,8 @@
           </a:p>
         </p:txBody>
       </p:sp>
-      <mc:AlternateContent xmlns:mc="http://schemas.openxmlformats.org/markup-compatibility/2006">
-        <mc:Choice xmlns:a14="http://schemas.microsoft.com/office/drawing/2010/main" Requires="a14">
+      <mc:AlternateContent xmlns:mc="http://schemas.openxmlformats.org/markup-compatibility/2006" xmlns:a14="http://schemas.microsoft.com/office/drawing/2010/main">
+        <mc:Choice Requires="a14">
           <p:sp>
             <p:nvSpPr>
               <p:cNvPr id="5" name="TextBox 4">
@@ -18816,6 +18787,7 @@
               </a:bodyPr>
               <a:lstStyle/>
               <a:p>
+                <a:pPr/>
                 <a14:m>
                   <m:oMathPara xmlns:m="http://schemas.openxmlformats.org/officeDocument/2006/math">
                     <m:oMathParaPr>
@@ -19012,7 +18984,7 @@
             </p:txBody>
           </p:sp>
         </mc:Choice>
-        <mc:Fallback>
+        <mc:Fallback xmlns="">
           <p:sp>
             <p:nvSpPr>
               <p:cNvPr id="5" name="TextBox 4">
@@ -19087,6 +19059,7 @@
               </a:bodyPr>
               <a:lstStyle/>
               <a:p>
+                <a:pPr/>
                 <a14:m>
                   <m:oMathPara xmlns:m="http://schemas.openxmlformats.org/officeDocument/2006/math">
                     <m:oMathParaPr>
@@ -19422,7 +19395,7 @@
                             <a:rPr lang="en-US" sz="1400" b="0" i="1" smtClean="0">
                               <a:latin typeface="Cambria Math" panose="02040503050406030204" pitchFamily="18" charset="0"/>
                             </a:rPr>
-                            <m:t>3</m:t>
+                            <m:t>4</m:t>
                           </m:r>
                         </m:sup>
                       </m:sSup>
@@ -19485,8 +19458,8 @@
           </p:sp>
         </mc:Fallback>
       </mc:AlternateContent>
-      <mc:AlternateContent xmlns:mc="http://schemas.openxmlformats.org/markup-compatibility/2006">
-        <mc:Choice xmlns:a14="http://schemas.microsoft.com/office/drawing/2010/main" Requires="a14">
+      <mc:AlternateContent xmlns:mc="http://schemas.openxmlformats.org/markup-compatibility/2006" xmlns:a14="http://schemas.microsoft.com/office/drawing/2010/main">
+        <mc:Choice Requires="a14">
           <p:sp>
             <p:nvSpPr>
               <p:cNvPr id="7" name="TextBox 6">
@@ -19515,6 +19488,7 @@
               </a:bodyPr>
               <a:lstStyle/>
               <a:p>
+                <a:pPr/>
                 <a14:m>
                   <m:oMathPara xmlns:m="http://schemas.openxmlformats.org/officeDocument/2006/math">
                     <m:oMathParaPr>
@@ -19732,7 +19706,7 @@
             </p:txBody>
           </p:sp>
         </mc:Choice>
-        <mc:Fallback>
+        <mc:Fallback xmlns="">
           <p:sp>
             <p:nvSpPr>
               <p:cNvPr id="7" name="TextBox 6">
@@ -19777,8 +19751,8 @@
           </p:sp>
         </mc:Fallback>
       </mc:AlternateContent>
-      <mc:AlternateContent xmlns:mc="http://schemas.openxmlformats.org/markup-compatibility/2006">
-        <mc:Choice xmlns:a14="http://schemas.microsoft.com/office/drawing/2010/main" Requires="a14">
+      <mc:AlternateContent xmlns:mc="http://schemas.openxmlformats.org/markup-compatibility/2006" xmlns:a14="http://schemas.microsoft.com/office/drawing/2010/main">
+        <mc:Choice Requires="a14">
           <p:sp>
             <p:nvSpPr>
               <p:cNvPr id="8" name="TextBox 7">
@@ -20073,7 +20047,7 @@
             </p:txBody>
           </p:sp>
         </mc:Choice>
-        <mc:Fallback>
+        <mc:Fallback xmlns="">
           <p:sp>
             <p:nvSpPr>
               <p:cNvPr id="8" name="TextBox 7">
@@ -20118,8 +20092,8 @@
           </p:sp>
         </mc:Fallback>
       </mc:AlternateContent>
-      <mc:AlternateContent xmlns:mc="http://schemas.openxmlformats.org/markup-compatibility/2006">
-        <mc:Choice xmlns:a14="http://schemas.microsoft.com/office/drawing/2010/main" Requires="a14">
+      <mc:AlternateContent xmlns:mc="http://schemas.openxmlformats.org/markup-compatibility/2006" xmlns:a14="http://schemas.microsoft.com/office/drawing/2010/main">
+        <mc:Choice Requires="a14">
           <p:sp>
             <p:nvSpPr>
               <p:cNvPr id="10" name="TextBox 9">
@@ -20389,7 +20363,7 @@
             </p:txBody>
           </p:sp>
         </mc:Choice>
-        <mc:Fallback>
+        <mc:Fallback xmlns="">
           <p:sp>
             <p:nvSpPr>
               <p:cNvPr id="10" name="TextBox 9">
@@ -20434,8 +20408,8 @@
           </p:sp>
         </mc:Fallback>
       </mc:AlternateContent>
-      <mc:AlternateContent xmlns:mc="http://schemas.openxmlformats.org/markup-compatibility/2006">
-        <mc:Choice xmlns:a14="http://schemas.microsoft.com/office/drawing/2010/main" Requires="a14">
+      <mc:AlternateContent xmlns:mc="http://schemas.openxmlformats.org/markup-compatibility/2006" xmlns:a14="http://schemas.microsoft.com/office/drawing/2010/main">
+        <mc:Choice Requires="a14">
           <p:sp>
             <p:nvSpPr>
               <p:cNvPr id="11" name="TextBox 10">
@@ -20902,7 +20876,7 @@
             </p:txBody>
           </p:sp>
         </mc:Choice>
-        <mc:Fallback>
+        <mc:Fallback xmlns="">
           <p:sp>
             <p:nvSpPr>
               <p:cNvPr id="11" name="TextBox 10">
@@ -20947,8 +20921,8 @@
           </p:sp>
         </mc:Fallback>
       </mc:AlternateContent>
-      <mc:AlternateContent xmlns:mc="http://schemas.openxmlformats.org/markup-compatibility/2006">
-        <mc:Choice xmlns:a14="http://schemas.microsoft.com/office/drawing/2010/main" Requires="a14">
+      <mc:AlternateContent xmlns:mc="http://schemas.openxmlformats.org/markup-compatibility/2006" xmlns:a14="http://schemas.microsoft.com/office/drawing/2010/main">
+        <mc:Choice Requires="a14">
           <p:sp>
             <p:nvSpPr>
               <p:cNvPr id="12" name="TextBox 11">
@@ -20977,6 +20951,7 @@
               </a:bodyPr>
               <a:lstStyle/>
               <a:p>
+                <a:pPr/>
                 <a14:m>
                   <m:oMathPara xmlns:m="http://schemas.openxmlformats.org/officeDocument/2006/math">
                     <m:oMathParaPr>
@@ -21090,7 +21065,7 @@
             </p:txBody>
           </p:sp>
         </mc:Choice>
-        <mc:Fallback>
+        <mc:Fallback xmlns="">
           <p:sp>
             <p:nvSpPr>
               <p:cNvPr id="12" name="TextBox 11">
@@ -21135,8 +21110,8 @@
           </p:sp>
         </mc:Fallback>
       </mc:AlternateContent>
-      <mc:AlternateContent xmlns:mc="http://schemas.openxmlformats.org/markup-compatibility/2006">
-        <mc:Choice xmlns:a14="http://schemas.microsoft.com/office/drawing/2010/main" Requires="a14">
+      <mc:AlternateContent xmlns:mc="http://schemas.openxmlformats.org/markup-compatibility/2006" xmlns:a14="http://schemas.microsoft.com/office/drawing/2010/main">
+        <mc:Choice Requires="a14">
           <p:sp>
             <p:nvSpPr>
               <p:cNvPr id="14" name="TextBox 13">
@@ -21297,7 +21272,7 @@
             </p:txBody>
           </p:sp>
         </mc:Choice>
-        <mc:Fallback>
+        <mc:Fallback xmlns="">
           <p:sp>
             <p:nvSpPr>
               <p:cNvPr id="14" name="TextBox 13">
@@ -21342,8 +21317,8 @@
           </p:sp>
         </mc:Fallback>
       </mc:AlternateContent>
-      <mc:AlternateContent xmlns:mc="http://schemas.openxmlformats.org/markup-compatibility/2006">
-        <mc:Choice xmlns:a14="http://schemas.microsoft.com/office/drawing/2010/main" Requires="a14">
+      <mc:AlternateContent xmlns:mc="http://schemas.openxmlformats.org/markup-compatibility/2006" xmlns:a14="http://schemas.microsoft.com/office/drawing/2010/main">
+        <mc:Choice Requires="a14">
           <p:sp>
             <p:nvSpPr>
               <p:cNvPr id="16" name="TextBox 15">
@@ -21488,7 +21463,7 @@
             </p:txBody>
           </p:sp>
         </mc:Choice>
-        <mc:Fallback>
+        <mc:Fallback xmlns="">
           <p:sp>
             <p:nvSpPr>
               <p:cNvPr id="16" name="TextBox 15">
@@ -21533,8 +21508,8 @@
           </p:sp>
         </mc:Fallback>
       </mc:AlternateContent>
-      <mc:AlternateContent xmlns:mc="http://schemas.openxmlformats.org/markup-compatibility/2006">
-        <mc:Choice xmlns:a14="http://schemas.microsoft.com/office/drawing/2010/main" Requires="a14">
+      <mc:AlternateContent xmlns:mc="http://schemas.openxmlformats.org/markup-compatibility/2006" xmlns:a14="http://schemas.microsoft.com/office/drawing/2010/main">
+        <mc:Choice Requires="a14">
           <p:sp>
             <p:nvSpPr>
               <p:cNvPr id="20" name="TextBox 19">
@@ -22060,7 +22035,7 @@
             </p:txBody>
           </p:sp>
         </mc:Choice>
-        <mc:Fallback>
+        <mc:Fallback xmlns="">
           <p:sp>
             <p:nvSpPr>
               <p:cNvPr id="20" name="TextBox 19">
@@ -22105,8 +22080,8 @@
           </p:sp>
         </mc:Fallback>
       </mc:AlternateContent>
-      <mc:AlternateContent xmlns:mc="http://schemas.openxmlformats.org/markup-compatibility/2006">
-        <mc:Choice xmlns:a14="http://schemas.microsoft.com/office/drawing/2010/main" Requires="a14">
+      <mc:AlternateContent xmlns:mc="http://schemas.openxmlformats.org/markup-compatibility/2006" xmlns:a14="http://schemas.microsoft.com/office/drawing/2010/main">
+        <mc:Choice Requires="a14">
           <p:sp>
             <p:nvSpPr>
               <p:cNvPr id="22" name="TextBox 21">
@@ -22275,7 +22250,7 @@
             </p:txBody>
           </p:sp>
         </mc:Choice>
-        <mc:Fallback>
+        <mc:Fallback xmlns="">
           <p:sp>
             <p:nvSpPr>
               <p:cNvPr id="22" name="TextBox 21">
@@ -22320,8 +22295,8 @@
           </p:sp>
         </mc:Fallback>
       </mc:AlternateContent>
-      <mc:AlternateContent xmlns:mc="http://schemas.openxmlformats.org/markup-compatibility/2006">
-        <mc:Choice xmlns:a14="http://schemas.microsoft.com/office/drawing/2010/main" Requires="a14">
+      <mc:AlternateContent xmlns:mc="http://schemas.openxmlformats.org/markup-compatibility/2006" xmlns:a14="http://schemas.microsoft.com/office/drawing/2010/main">
+        <mc:Choice Requires="a14">
           <p:sp>
             <p:nvSpPr>
               <p:cNvPr id="24" name="TextBox 23">
@@ -22752,7 +22727,7 @@
             </p:txBody>
           </p:sp>
         </mc:Choice>
-        <mc:Fallback>
+        <mc:Fallback xmlns="">
           <p:sp>
             <p:nvSpPr>
               <p:cNvPr id="24" name="TextBox 23">
@@ -22797,8 +22772,8 @@
           </p:sp>
         </mc:Fallback>
       </mc:AlternateContent>
-      <mc:AlternateContent xmlns:mc="http://schemas.openxmlformats.org/markup-compatibility/2006">
-        <mc:Choice xmlns:a14="http://schemas.microsoft.com/office/drawing/2010/main" Requires="a14">
+      <mc:AlternateContent xmlns:mc="http://schemas.openxmlformats.org/markup-compatibility/2006" xmlns:a14="http://schemas.microsoft.com/office/drawing/2010/main">
+        <mc:Choice Requires="a14">
           <p:sp>
             <p:nvSpPr>
               <p:cNvPr id="26" name="TextBox 25">
@@ -22913,7 +22888,7 @@
             </p:txBody>
           </p:sp>
         </mc:Choice>
-        <mc:Fallback>
+        <mc:Fallback xmlns="">
           <p:sp>
             <p:nvSpPr>
               <p:cNvPr id="26" name="TextBox 25">
@@ -23889,8 +23864,8 @@
           </a:p>
         </p:txBody>
       </p:sp>
-      <mc:AlternateContent xmlns:mc="http://schemas.openxmlformats.org/markup-compatibility/2006">
-        <mc:Choice xmlns:a14="http://schemas.microsoft.com/office/drawing/2010/main" Requires="a14">
+      <mc:AlternateContent xmlns:mc="http://schemas.openxmlformats.org/markup-compatibility/2006" xmlns:a14="http://schemas.microsoft.com/office/drawing/2010/main">
+        <mc:Choice Requires="a14">
           <p:sp>
             <p:nvSpPr>
               <p:cNvPr id="11" name="TextBox 10">
@@ -24364,7 +24339,7 @@
             </p:txBody>
           </p:sp>
         </mc:Choice>
-        <mc:Fallback>
+        <mc:Fallback xmlns="">
           <p:sp>
             <p:nvSpPr>
               <p:cNvPr id="11" name="TextBox 10">
@@ -24598,7 +24573,7 @@
           </a:ln>
           <a:extLst>
             <a:ext uri="{C572A759-6A51-4108-AA02-DFA0A04FC94B}">
-              <ma14:wrappingTextBoxFlag xmlns="" xmlns:m="http://schemas.openxmlformats.org/officeDocument/2006/math" xmlns:a14="http://schemas.microsoft.com/office/drawing/2010/main" xmlns:ma14="http://schemas.microsoft.com/office/mac/drawingml/2011/main" val="1"/>
+              <ma14:wrappingTextBoxFlag xmlns:ma14="http://schemas.microsoft.com/office/mac/drawingml/2011/main" xmlns:a14="http://schemas.microsoft.com/office/drawing/2010/main" xmlns:m="http://schemas.openxmlformats.org/officeDocument/2006/math" xmlns="" val="1"/>
             </a:ext>
           </a:extLst>
         </p:spPr>
@@ -25151,7 +25126,7 @@
           </a:ln>
           <a:extLst>
             <a:ext uri="{C572A759-6A51-4108-AA02-DFA0A04FC94B}">
-              <ma14:wrappingTextBoxFlag xmlns="" xmlns:m="http://schemas.openxmlformats.org/officeDocument/2006/math" xmlns:a14="http://schemas.microsoft.com/office/drawing/2010/main" xmlns:ma14="http://schemas.microsoft.com/office/mac/drawingml/2011/main" val="1"/>
+              <ma14:wrappingTextBoxFlag xmlns:ma14="http://schemas.microsoft.com/office/mac/drawingml/2011/main" xmlns:a14="http://schemas.microsoft.com/office/drawing/2010/main" xmlns:m="http://schemas.openxmlformats.org/officeDocument/2006/math" xmlns="" val="1"/>
             </a:ext>
           </a:extLst>
         </p:spPr>
@@ -25578,7 +25553,7 @@
           </a:ln>
           <a:extLst>
             <a:ext uri="{C572A759-6A51-4108-AA02-DFA0A04FC94B}">
-              <ma14:wrappingTextBoxFlag xmlns="" xmlns:m="http://schemas.openxmlformats.org/officeDocument/2006/math" xmlns:a14="http://schemas.microsoft.com/office/drawing/2010/main" xmlns:ma14="http://schemas.microsoft.com/office/mac/drawingml/2011/main" val="1"/>
+              <ma14:wrappingTextBoxFlag xmlns:ma14="http://schemas.microsoft.com/office/mac/drawingml/2011/main" xmlns:a14="http://schemas.microsoft.com/office/drawing/2010/main" xmlns:m="http://schemas.openxmlformats.org/officeDocument/2006/math" xmlns="" val="1"/>
             </a:ext>
           </a:extLst>
         </p:spPr>
@@ -25822,7 +25797,7 @@
           </a:ln>
           <a:extLst>
             <a:ext uri="{C572A759-6A51-4108-AA02-DFA0A04FC94B}">
-              <ma14:wrappingTextBoxFlag xmlns="" xmlns:m="http://schemas.openxmlformats.org/officeDocument/2006/math" xmlns:a14="http://schemas.microsoft.com/office/drawing/2010/main" xmlns:ma14="http://schemas.microsoft.com/office/mac/drawingml/2011/main" val="1"/>
+              <ma14:wrappingTextBoxFlag xmlns:ma14="http://schemas.microsoft.com/office/mac/drawingml/2011/main" xmlns:a14="http://schemas.microsoft.com/office/drawing/2010/main" xmlns:m="http://schemas.openxmlformats.org/officeDocument/2006/math" xmlns="" val="1"/>
             </a:ext>
           </a:extLst>
         </p:spPr>

</xml_diff>